<commit_message>
4 separate slides into a single
</commit_message>
<xml_diff>
--- a/content/programmeren/php-basis-operators-is/php-basis-operators-is.pptx
+++ b/content/programmeren/php-basis-operators-is/php-basis-operators-is.pptx
@@ -5,10 +5,7 @@
     <p:sldMasterId id="2147483648" r:id="rId1"/>
   </p:sldMasterIdLst>
   <p:sldIdLst>
-    <p:sldId id="256" r:id="rId2"/>
-    <p:sldId id="257" r:id="rId3"/>
-    <p:sldId id="258" r:id="rId4"/>
-    <p:sldId id="259" r:id="rId5"/>
+    <p:sldId id="260" r:id="rId2"/>
   </p:sldIdLst>
   <p:sldSz cx="12192000" cy="6858000"/>
   <p:notesSz cx="6858000" cy="9144000"/>
@@ -120,7 +117,7 @@
             <a:srgbClr val="A4A3A4"/>
           </p15:clr>
         </p15:guide>
-        <p15:guide id="3" pos="210" userDrawn="1">
+        <p15:guide id="3" pos="211" userDrawn="1">
           <p15:clr>
             <a:srgbClr val="000000"/>
           </p15:clr>
@@ -522,7 +519,7 @@
           <a:lstStyle/>
           <a:p>
             <a:fld id="{58F0AE5A-190D-344F-BA1E-7FF8AC8FA5BE}" type="datetimeFigureOut">
-              <a:t>11-11-2020</a:t>
+              <a:t>12-11-2020</a:t>
             </a:fld>
             <a:endParaRPr lang="nl-NL"/>
           </a:p>
@@ -718,7 +715,7 @@
           <a:lstStyle/>
           <a:p>
             <a:fld id="{58F0AE5A-190D-344F-BA1E-7FF8AC8FA5BE}" type="datetimeFigureOut">
-              <a:t>11-11-2020</a:t>
+              <a:t>12-11-2020</a:t>
             </a:fld>
             <a:endParaRPr lang="nl-NL"/>
           </a:p>
@@ -924,7 +921,7 @@
           <a:lstStyle/>
           <a:p>
             <a:fld id="{58F0AE5A-190D-344F-BA1E-7FF8AC8FA5BE}" type="datetimeFigureOut">
-              <a:t>11-11-2020</a:t>
+              <a:t>12-11-2020</a:t>
             </a:fld>
             <a:endParaRPr lang="nl-NL"/>
           </a:p>
@@ -1120,7 +1117,7 @@
           <a:lstStyle/>
           <a:p>
             <a:fld id="{58F0AE5A-190D-344F-BA1E-7FF8AC8FA5BE}" type="datetimeFigureOut">
-              <a:t>11-11-2020</a:t>
+              <a:t>12-11-2020</a:t>
             </a:fld>
             <a:endParaRPr lang="nl-NL"/>
           </a:p>
@@ -1393,7 +1390,7 @@
           <a:lstStyle/>
           <a:p>
             <a:fld id="{58F0AE5A-190D-344F-BA1E-7FF8AC8FA5BE}" type="datetimeFigureOut">
-              <a:t>11-11-2020</a:t>
+              <a:t>12-11-2020</a:t>
             </a:fld>
             <a:endParaRPr lang="nl-NL"/>
           </a:p>
@@ -1656,7 +1653,7 @@
           <a:lstStyle/>
           <a:p>
             <a:fld id="{58F0AE5A-190D-344F-BA1E-7FF8AC8FA5BE}" type="datetimeFigureOut">
-              <a:t>11-11-2020</a:t>
+              <a:t>12-11-2020</a:t>
             </a:fld>
             <a:endParaRPr lang="nl-NL"/>
           </a:p>
@@ -2066,7 +2063,7 @@
           <a:lstStyle/>
           <a:p>
             <a:fld id="{58F0AE5A-190D-344F-BA1E-7FF8AC8FA5BE}" type="datetimeFigureOut">
-              <a:t>11-11-2020</a:t>
+              <a:t>12-11-2020</a:t>
             </a:fld>
             <a:endParaRPr lang="nl-NL"/>
           </a:p>
@@ -2205,7 +2202,7 @@
           <a:lstStyle/>
           <a:p>
             <a:fld id="{58F0AE5A-190D-344F-BA1E-7FF8AC8FA5BE}" type="datetimeFigureOut">
-              <a:t>11-11-2020</a:t>
+              <a:t>12-11-2020</a:t>
             </a:fld>
             <a:endParaRPr lang="nl-NL"/>
           </a:p>
@@ -2316,7 +2313,7 @@
           <a:lstStyle/>
           <a:p>
             <a:fld id="{58F0AE5A-190D-344F-BA1E-7FF8AC8FA5BE}" type="datetimeFigureOut">
-              <a:t>11-11-2020</a:t>
+              <a:t>12-11-2020</a:t>
             </a:fld>
             <a:endParaRPr lang="nl-NL"/>
           </a:p>
@@ -2625,7 +2622,7 @@
           <a:lstStyle/>
           <a:p>
             <a:fld id="{58F0AE5A-190D-344F-BA1E-7FF8AC8FA5BE}" type="datetimeFigureOut">
-              <a:t>11-11-2020</a:t>
+              <a:t>12-11-2020</a:t>
             </a:fld>
             <a:endParaRPr lang="nl-NL"/>
           </a:p>
@@ -2914,7 +2911,7 @@
           <a:lstStyle/>
           <a:p>
             <a:fld id="{58F0AE5A-190D-344F-BA1E-7FF8AC8FA5BE}" type="datetimeFigureOut">
-              <a:t>11-11-2020</a:t>
+              <a:t>12-11-2020</a:t>
             </a:fld>
             <a:endParaRPr lang="nl-NL"/>
           </a:p>
@@ -3153,7 +3150,7 @@
           </a:lstStyle>
           <a:p>
             <a:fld id="{58F0AE5A-190D-344F-BA1E-7FF8AC8FA5BE}" type="datetimeFigureOut">
-              <a:t>11-11-2020</a:t>
+              <a:t>12-11-2020</a:t>
             </a:fld>
             <a:endParaRPr lang="nl-NL"/>
           </a:p>
@@ -3571,10 +3568,10 @@
       </p:grpSpPr>
       <p:pic>
         <p:nvPicPr>
-          <p:cNvPr id="3" name="Graphic 2" descr="Appel">
-            <a:extLst>
-              <a:ext uri="{FF2B5EF4-FFF2-40B4-BE49-F238E27FC236}">
-                <a16:creationId xmlns:a16="http://schemas.microsoft.com/office/drawing/2014/main" id="{2427324D-01E2-EB4A-97F0-F6577F1A29B2}"/>
+          <p:cNvPr id="2" name="Graphic 1" descr="Appel">
+            <a:extLst>
+              <a:ext uri="{FF2B5EF4-FFF2-40B4-BE49-F238E27FC236}">
+                <a16:creationId xmlns:a16="http://schemas.microsoft.com/office/drawing/2014/main" id="{9BFE1F2F-5F5E-0543-95CB-BB79D480CFE3}"/>
               </a:ext>
             </a:extLst>
           </p:cNvPr>
@@ -3597,8 +3594,8 @@
         </p:blipFill>
         <p:spPr>
           <a:xfrm>
-            <a:off x="2165626" y="2184604"/>
-            <a:ext cx="2155963" cy="2155963"/>
+            <a:off x="447238" y="417100"/>
+            <a:ext cx="1631217" cy="1631217"/>
           </a:xfrm>
           <a:prstGeom prst="rect">
             <a:avLst/>
@@ -3607,10 +3604,10 @@
       </p:pic>
       <p:pic>
         <p:nvPicPr>
-          <p:cNvPr id="5" name="Graphic 4" descr="Kersen">
-            <a:extLst>
-              <a:ext uri="{FF2B5EF4-FFF2-40B4-BE49-F238E27FC236}">
-                <a16:creationId xmlns:a16="http://schemas.microsoft.com/office/drawing/2014/main" id="{7DB22F6F-056A-8F47-8DCB-C446F9FB3848}"/>
+          <p:cNvPr id="3" name="Graphic 2" descr="Kersen">
+            <a:extLst>
+              <a:ext uri="{FF2B5EF4-FFF2-40B4-BE49-F238E27FC236}">
+                <a16:creationId xmlns:a16="http://schemas.microsoft.com/office/drawing/2014/main" id="{9B972611-992C-214F-862E-066CD173BA0D}"/>
               </a:ext>
             </a:extLst>
           </p:cNvPr>
@@ -3633,8 +3630,8 @@
         </p:blipFill>
         <p:spPr>
           <a:xfrm>
-            <a:off x="7702826" y="2088528"/>
-            <a:ext cx="2566225" cy="2566225"/>
+            <a:off x="3276333" y="336128"/>
+            <a:ext cx="1864569" cy="1864569"/>
           </a:xfrm>
           <a:prstGeom prst="rect">
             <a:avLst/>
@@ -3643,10 +3640,10 @@
       </p:pic>
       <p:sp>
         <p:nvSpPr>
-          <p:cNvPr id="6" name="Tekstvak 5">
-            <a:extLst>
-              <a:ext uri="{FF2B5EF4-FFF2-40B4-BE49-F238E27FC236}">
-                <a16:creationId xmlns:a16="http://schemas.microsoft.com/office/drawing/2014/main" id="{EA4AC69E-9CD2-B146-8913-3D5BEA6B7FC9}"/>
+          <p:cNvPr id="4" name="Tekstvak 3">
+            <a:extLst>
+              <a:ext uri="{FF2B5EF4-FFF2-40B4-BE49-F238E27FC236}">
+                <a16:creationId xmlns:a16="http://schemas.microsoft.com/office/drawing/2014/main" id="{FD5ABA9B-0F49-9843-B315-E8015DC1D62F}"/>
               </a:ext>
             </a:extLst>
           </p:cNvPr>
@@ -3655,8 +3652,8 @@
         </p:nvSpPr>
         <p:spPr>
           <a:xfrm>
-            <a:off x="5210982" y="2171311"/>
-            <a:ext cx="1770036" cy="2400657"/>
+            <a:off x="1693324" y="417100"/>
+            <a:ext cx="1770036" cy="1631216"/>
           </a:xfrm>
           <a:prstGeom prst="rect">
             <a:avLst/>
@@ -3664,55 +3661,25 @@
           <a:noFill/>
         </p:spPr>
         <p:txBody>
-          <a:bodyPr wrap="none" rtlCol="0">
+          <a:bodyPr wrap="square" rtlCol="0">
             <a:spAutoFit/>
           </a:bodyPr>
           <a:lstStyle/>
           <a:p>
             <a:pPr algn="ctr"/>
             <a:r>
-              <a:rPr lang="nl-NL" sz="15000" b="1"/>
+              <a:rPr lang="nl-NL" sz="10000" b="1"/>
               <a:t>!=</a:t>
             </a:r>
           </a:p>
         </p:txBody>
       </p:sp>
-    </p:spTree>
-    <p:extLst>
-      <p:ext uri="{BB962C8B-B14F-4D97-AF65-F5344CB8AC3E}">
-        <p14:creationId xmlns:p14="http://schemas.microsoft.com/office/powerpoint/2010/main" val="1035786899"/>
-      </p:ext>
-    </p:extLst>
-  </p:cSld>
-  <p:clrMapOvr>
-    <a:masterClrMapping/>
-  </p:clrMapOvr>
-</p:sld>
-</file>
-
-<file path=ppt/slides/slide2.xml><?xml version="1.0" encoding="utf-8"?>
-<p:sld xmlns:a="http://schemas.openxmlformats.org/drawingml/2006/main" xmlns:r="http://schemas.openxmlformats.org/officeDocument/2006/relationships" xmlns:p="http://schemas.openxmlformats.org/presentationml/2006/main">
-  <p:cSld>
-    <p:spTree>
-      <p:nvGrpSpPr>
-        <p:cNvPr id="1" name=""/>
-        <p:cNvGrpSpPr/>
-        <p:nvPr/>
-      </p:nvGrpSpPr>
-      <p:grpSpPr>
-        <a:xfrm>
-          <a:off x="0" y="0"/>
-          <a:ext cx="0" cy="0"/>
-          <a:chOff x="0" y="0"/>
-          <a:chExt cx="0" cy="0"/>
-        </a:xfrm>
-      </p:grpSpPr>
       <p:pic>
         <p:nvPicPr>
-          <p:cNvPr id="3" name="Graphic 2" descr="Appel">
-            <a:extLst>
-              <a:ext uri="{FF2B5EF4-FFF2-40B4-BE49-F238E27FC236}">
-                <a16:creationId xmlns:a16="http://schemas.microsoft.com/office/drawing/2014/main" id="{2427324D-01E2-EB4A-97F0-F6577F1A29B2}"/>
+          <p:cNvPr id="8" name="Graphic 7" descr="Appel">
+            <a:extLst>
+              <a:ext uri="{FF2B5EF4-FFF2-40B4-BE49-F238E27FC236}">
+                <a16:creationId xmlns:a16="http://schemas.microsoft.com/office/drawing/2014/main" id="{0CC02A29-720C-EF42-954F-611B21105042}"/>
               </a:ext>
             </a:extLst>
           </p:cNvPr>
@@ -3735,8 +3702,8 @@
         </p:blipFill>
         <p:spPr>
           <a:xfrm>
-            <a:off x="2165626" y="2184604"/>
-            <a:ext cx="2155963" cy="2155963"/>
+            <a:off x="6873670" y="417100"/>
+            <a:ext cx="1631217" cy="1631217"/>
           </a:xfrm>
           <a:prstGeom prst="rect">
             <a:avLst/>
@@ -3745,10 +3712,10 @@
       </p:pic>
       <p:sp>
         <p:nvSpPr>
-          <p:cNvPr id="6" name="Tekstvak 5">
-            <a:extLst>
-              <a:ext uri="{FF2B5EF4-FFF2-40B4-BE49-F238E27FC236}">
-                <a16:creationId xmlns:a16="http://schemas.microsoft.com/office/drawing/2014/main" id="{EA4AC69E-9CD2-B146-8913-3D5BEA6B7FC9}"/>
+          <p:cNvPr id="9" name="Tekstvak 8">
+            <a:extLst>
+              <a:ext uri="{FF2B5EF4-FFF2-40B4-BE49-F238E27FC236}">
+                <a16:creationId xmlns:a16="http://schemas.microsoft.com/office/drawing/2014/main" id="{5FBBEBCF-8196-D647-AACB-E60BECDF8742}"/>
               </a:ext>
             </a:extLst>
           </p:cNvPr>
@@ -3757,8 +3724,8 @@
         </p:nvSpPr>
         <p:spPr>
           <a:xfrm>
-            <a:off x="5045072" y="2171311"/>
-            <a:ext cx="2101857" cy="2400657"/>
+            <a:off x="8424198" y="415082"/>
+            <a:ext cx="1770036" cy="1631216"/>
           </a:xfrm>
           <a:prstGeom prst="rect">
             <a:avLst/>
@@ -3766,14 +3733,14 @@
           <a:noFill/>
         </p:spPr>
         <p:txBody>
-          <a:bodyPr wrap="none" rtlCol="0">
+          <a:bodyPr wrap="square" rtlCol="0">
             <a:spAutoFit/>
           </a:bodyPr>
           <a:lstStyle/>
           <a:p>
             <a:pPr algn="ctr"/>
             <a:r>
-              <a:rPr lang="nl-NL" sz="15000" b="1"/>
+              <a:rPr lang="nl-NL" sz="10000" b="1"/>
               <a:t>==</a:t>
             </a:r>
           </a:p>
@@ -3781,10 +3748,10 @@
       </p:sp>
       <p:pic>
         <p:nvPicPr>
-          <p:cNvPr id="7" name="Graphic 6" descr="Appel">
-            <a:extLst>
-              <a:ext uri="{FF2B5EF4-FFF2-40B4-BE49-F238E27FC236}">
-                <a16:creationId xmlns:a16="http://schemas.microsoft.com/office/drawing/2014/main" id="{FECE7ACC-09EE-8246-9A30-4AEECC97970F}"/>
+          <p:cNvPr id="10" name="Graphic 9" descr="Appel">
+            <a:extLst>
+              <a:ext uri="{FF2B5EF4-FFF2-40B4-BE49-F238E27FC236}">
+                <a16:creationId xmlns:a16="http://schemas.microsoft.com/office/drawing/2014/main" id="{C6DAF087-EF9F-CD4C-AD88-F088D241FED7}"/>
               </a:ext>
             </a:extLst>
           </p:cNvPr>
@@ -3794,10 +3761,10 @@
           <p:nvPr/>
         </p:nvPicPr>
         <p:blipFill>
-          <a:blip r:embed="rId4">
+          <a:blip r:embed="rId6">
             <a:extLst>
               <a:ext uri="{96DAC541-7B7A-43D3-8B79-37D633B846F1}">
-                <asvg:svgBlip xmlns:asvg="http://schemas.microsoft.com/office/drawing/2016/SVG/main" r:embed="rId5"/>
+                <asvg:svgBlip xmlns:asvg="http://schemas.microsoft.com/office/drawing/2016/SVG/main" r:embed="rId7"/>
               </a:ext>
             </a:extLst>
           </a:blip>
@@ -3807,8 +3774,224 @@
         </p:blipFill>
         <p:spPr>
           <a:xfrm>
-            <a:off x="7870411" y="2181250"/>
-            <a:ext cx="2155963" cy="2155963"/>
+            <a:off x="10113545" y="429659"/>
+            <a:ext cx="1631217" cy="1631217"/>
+          </a:xfrm>
+          <a:prstGeom prst="rect">
+            <a:avLst/>
+          </a:prstGeom>
+        </p:spPr>
+      </p:pic>
+      <p:pic>
+        <p:nvPicPr>
+          <p:cNvPr id="11" name="Graphic 10" descr="Appel">
+            <a:extLst>
+              <a:ext uri="{FF2B5EF4-FFF2-40B4-BE49-F238E27FC236}">
+                <a16:creationId xmlns:a16="http://schemas.microsoft.com/office/drawing/2014/main" id="{BDDDF2FF-9F6D-794B-9689-FD3719890853}"/>
+              </a:ext>
+            </a:extLst>
+          </p:cNvPr>
+          <p:cNvPicPr>
+            <a:picLocks noChangeAspect="1"/>
+          </p:cNvPicPr>
+          <p:nvPr/>
+        </p:nvPicPr>
+        <p:blipFill>
+          <a:blip r:embed="rId2">
+            <a:extLst>
+              <a:ext uri="{96DAC541-7B7A-43D3-8B79-37D633B846F1}">
+                <asvg:svgBlip xmlns:asvg="http://schemas.microsoft.com/office/drawing/2016/SVG/main" r:embed="rId3"/>
+              </a:ext>
+            </a:extLst>
+          </a:blip>
+          <a:stretch>
+            <a:fillRect/>
+          </a:stretch>
+        </p:blipFill>
+        <p:spPr>
+          <a:xfrm>
+            <a:off x="447238" y="4809683"/>
+            <a:ext cx="1631217" cy="1631217"/>
+          </a:xfrm>
+          <a:prstGeom prst="rect">
+            <a:avLst/>
+          </a:prstGeom>
+        </p:spPr>
+      </p:pic>
+      <p:sp>
+        <p:nvSpPr>
+          <p:cNvPr id="12" name="Tekstvak 11">
+            <a:extLst>
+              <a:ext uri="{FF2B5EF4-FFF2-40B4-BE49-F238E27FC236}">
+                <a16:creationId xmlns:a16="http://schemas.microsoft.com/office/drawing/2014/main" id="{F19E8701-3525-C841-A5CA-EF2CF7A3B64E}"/>
+              </a:ext>
+            </a:extLst>
+          </p:cNvPr>
+          <p:cNvSpPr txBox="1"/>
+          <p:nvPr/>
+        </p:nvSpPr>
+        <p:spPr>
+          <a:xfrm>
+            <a:off x="1838624" y="4773980"/>
+            <a:ext cx="1864568" cy="1631216"/>
+          </a:xfrm>
+          <a:prstGeom prst="rect">
+            <a:avLst/>
+          </a:prstGeom>
+          <a:noFill/>
+        </p:spPr>
+        <p:txBody>
+          <a:bodyPr wrap="square" rtlCol="0">
+            <a:spAutoFit/>
+          </a:bodyPr>
+          <a:lstStyle/>
+          <a:p>
+            <a:pPr algn="ctr"/>
+            <a:r>
+              <a:rPr lang="nl-NL" sz="10000" b="1"/>
+              <a:t>!==</a:t>
+            </a:r>
+          </a:p>
+        </p:txBody>
+      </p:sp>
+      <p:pic>
+        <p:nvPicPr>
+          <p:cNvPr id="13" name="Graphic 12" descr="Appel">
+            <a:extLst>
+              <a:ext uri="{FF2B5EF4-FFF2-40B4-BE49-F238E27FC236}">
+                <a16:creationId xmlns:a16="http://schemas.microsoft.com/office/drawing/2014/main" id="{7EBEA7CA-9EE0-7D4D-B435-CB0BA4E862E6}"/>
+              </a:ext>
+            </a:extLst>
+          </p:cNvPr>
+          <p:cNvPicPr>
+            <a:picLocks noChangeAspect="1"/>
+          </p:cNvPicPr>
+          <p:nvPr/>
+        </p:nvPicPr>
+        <p:blipFill>
+          <a:blip r:embed="rId6">
+            <a:extLst>
+              <a:ext uri="{96DAC541-7B7A-43D3-8B79-37D633B846F1}">
+                <asvg:svgBlip xmlns:asvg="http://schemas.microsoft.com/office/drawing/2016/SVG/main" r:embed="rId7"/>
+              </a:ext>
+            </a:extLst>
+          </a:blip>
+          <a:stretch>
+            <a:fillRect/>
+          </a:stretch>
+        </p:blipFill>
+        <p:spPr>
+          <a:xfrm>
+            <a:off x="3463360" y="4809683"/>
+            <a:ext cx="1631217" cy="1631217"/>
+          </a:xfrm>
+          <a:prstGeom prst="rect">
+            <a:avLst/>
+          </a:prstGeom>
+        </p:spPr>
+      </p:pic>
+      <p:pic>
+        <p:nvPicPr>
+          <p:cNvPr id="14" name="Graphic 13" descr="Appel">
+            <a:extLst>
+              <a:ext uri="{FF2B5EF4-FFF2-40B4-BE49-F238E27FC236}">
+                <a16:creationId xmlns:a16="http://schemas.microsoft.com/office/drawing/2014/main" id="{EBCDE9CD-78EF-7C4A-A32A-E1B261380D73}"/>
+              </a:ext>
+            </a:extLst>
+          </p:cNvPr>
+          <p:cNvPicPr>
+            <a:picLocks noChangeAspect="1"/>
+          </p:cNvPicPr>
+          <p:nvPr/>
+        </p:nvPicPr>
+        <p:blipFill>
+          <a:blip r:embed="rId2">
+            <a:extLst>
+              <a:ext uri="{96DAC541-7B7A-43D3-8B79-37D633B846F1}">
+                <asvg:svgBlip xmlns:asvg="http://schemas.microsoft.com/office/drawing/2016/SVG/main" r:embed="rId3"/>
+              </a:ext>
+            </a:extLst>
+          </a:blip>
+          <a:stretch>
+            <a:fillRect/>
+          </a:stretch>
+        </p:blipFill>
+        <p:spPr>
+          <a:xfrm>
+            <a:off x="6516564" y="4798835"/>
+            <a:ext cx="1631217" cy="1631217"/>
+          </a:xfrm>
+          <a:prstGeom prst="rect">
+            <a:avLst/>
+          </a:prstGeom>
+        </p:spPr>
+      </p:pic>
+      <p:sp>
+        <p:nvSpPr>
+          <p:cNvPr id="15" name="Tekstvak 14">
+            <a:extLst>
+              <a:ext uri="{FF2B5EF4-FFF2-40B4-BE49-F238E27FC236}">
+                <a16:creationId xmlns:a16="http://schemas.microsoft.com/office/drawing/2014/main" id="{9ED8AC2F-611B-9D49-A071-20573161707C}"/>
+              </a:ext>
+            </a:extLst>
+          </p:cNvPr>
+          <p:cNvSpPr txBox="1"/>
+          <p:nvPr/>
+        </p:nvSpPr>
+        <p:spPr>
+          <a:xfrm>
+            <a:off x="8052266" y="4773980"/>
+            <a:ext cx="2156794" cy="1631216"/>
+          </a:xfrm>
+          <a:prstGeom prst="rect">
+            <a:avLst/>
+          </a:prstGeom>
+          <a:noFill/>
+        </p:spPr>
+        <p:txBody>
+          <a:bodyPr wrap="square" rtlCol="0">
+            <a:spAutoFit/>
+          </a:bodyPr>
+          <a:lstStyle/>
+          <a:p>
+            <a:pPr algn="ctr"/>
+            <a:r>
+              <a:rPr lang="nl-NL" sz="10000" b="1"/>
+              <a:t>===</a:t>
+            </a:r>
+          </a:p>
+        </p:txBody>
+      </p:sp>
+      <p:pic>
+        <p:nvPicPr>
+          <p:cNvPr id="16" name="Graphic 15" descr="Appel">
+            <a:extLst>
+              <a:ext uri="{FF2B5EF4-FFF2-40B4-BE49-F238E27FC236}">
+                <a16:creationId xmlns:a16="http://schemas.microsoft.com/office/drawing/2014/main" id="{E6B25A15-8F42-814A-9323-20CCD50D3F00}"/>
+              </a:ext>
+            </a:extLst>
+          </p:cNvPr>
+          <p:cNvPicPr>
+            <a:picLocks noChangeAspect="1"/>
+          </p:cNvPicPr>
+          <p:nvPr/>
+        </p:nvPicPr>
+        <p:blipFill>
+          <a:blip r:embed="rId2">
+            <a:extLst>
+              <a:ext uri="{96DAC541-7B7A-43D3-8B79-37D633B846F1}">
+                <asvg:svgBlip xmlns:asvg="http://schemas.microsoft.com/office/drawing/2016/SVG/main" r:embed="rId3"/>
+              </a:ext>
+            </a:extLst>
+          </a:blip>
+          <a:stretch>
+            <a:fillRect/>
+          </a:stretch>
+        </p:blipFill>
+        <p:spPr>
+          <a:xfrm>
+            <a:off x="10113545" y="4797125"/>
+            <a:ext cx="1631217" cy="1631217"/>
           </a:xfrm>
           <a:prstGeom prst="rect">
             <a:avLst/>
@@ -3818,283 +4001,7 @@
     </p:spTree>
     <p:extLst>
       <p:ext uri="{BB962C8B-B14F-4D97-AF65-F5344CB8AC3E}">
-        <p14:creationId xmlns:p14="http://schemas.microsoft.com/office/powerpoint/2010/main" val="4152276881"/>
-      </p:ext>
-    </p:extLst>
-  </p:cSld>
-  <p:clrMapOvr>
-    <a:masterClrMapping/>
-  </p:clrMapOvr>
-</p:sld>
-</file>
-
-<file path=ppt/slides/slide3.xml><?xml version="1.0" encoding="utf-8"?>
-<p:sld xmlns:a="http://schemas.openxmlformats.org/drawingml/2006/main" xmlns:r="http://schemas.openxmlformats.org/officeDocument/2006/relationships" xmlns:p="http://schemas.openxmlformats.org/presentationml/2006/main">
-  <p:cSld>
-    <p:spTree>
-      <p:nvGrpSpPr>
-        <p:cNvPr id="1" name=""/>
-        <p:cNvGrpSpPr/>
-        <p:nvPr/>
-      </p:nvGrpSpPr>
-      <p:grpSpPr>
-        <a:xfrm>
-          <a:off x="0" y="0"/>
-          <a:ext cx="0" cy="0"/>
-          <a:chOff x="0" y="0"/>
-          <a:chExt cx="0" cy="0"/>
-        </a:xfrm>
-      </p:grpSpPr>
-      <p:pic>
-        <p:nvPicPr>
-          <p:cNvPr id="3" name="Graphic 2" descr="Appel">
-            <a:extLst>
-              <a:ext uri="{FF2B5EF4-FFF2-40B4-BE49-F238E27FC236}">
-                <a16:creationId xmlns:a16="http://schemas.microsoft.com/office/drawing/2014/main" id="{2427324D-01E2-EB4A-97F0-F6577F1A29B2}"/>
-              </a:ext>
-            </a:extLst>
-          </p:cNvPr>
-          <p:cNvPicPr>
-            <a:picLocks noChangeAspect="1"/>
-          </p:cNvPicPr>
-          <p:nvPr/>
-        </p:nvPicPr>
-        <p:blipFill>
-          <a:blip r:embed="rId2">
-            <a:extLst>
-              <a:ext uri="{96DAC541-7B7A-43D3-8B79-37D633B846F1}">
-                <asvg:svgBlip xmlns:asvg="http://schemas.microsoft.com/office/drawing/2016/SVG/main" r:embed="rId3"/>
-              </a:ext>
-            </a:extLst>
-          </a:blip>
-          <a:stretch>
-            <a:fillRect/>
-          </a:stretch>
-        </p:blipFill>
-        <p:spPr>
-          <a:xfrm>
-            <a:off x="2165626" y="2184604"/>
-            <a:ext cx="2155963" cy="2155963"/>
-          </a:xfrm>
-          <a:prstGeom prst="rect">
-            <a:avLst/>
-          </a:prstGeom>
-        </p:spPr>
-      </p:pic>
-      <p:sp>
-        <p:nvSpPr>
-          <p:cNvPr id="6" name="Tekstvak 5">
-            <a:extLst>
-              <a:ext uri="{FF2B5EF4-FFF2-40B4-BE49-F238E27FC236}">
-                <a16:creationId xmlns:a16="http://schemas.microsoft.com/office/drawing/2014/main" id="{EA4AC69E-9CD2-B146-8913-3D5BEA6B7FC9}"/>
-              </a:ext>
-            </a:extLst>
-          </p:cNvPr>
-          <p:cNvSpPr txBox="1"/>
-          <p:nvPr/>
-        </p:nvSpPr>
-        <p:spPr>
-          <a:xfrm>
-            <a:off x="4731685" y="2171311"/>
-            <a:ext cx="2728632" cy="2400657"/>
-          </a:xfrm>
-          <a:prstGeom prst="rect">
-            <a:avLst/>
-          </a:prstGeom>
-          <a:noFill/>
-        </p:spPr>
-        <p:txBody>
-          <a:bodyPr wrap="none" rtlCol="0">
-            <a:spAutoFit/>
-          </a:bodyPr>
-          <a:lstStyle/>
-          <a:p>
-            <a:pPr algn="ctr"/>
-            <a:r>
-              <a:rPr lang="nl-NL" sz="15000" b="1"/>
-              <a:t>!==</a:t>
-            </a:r>
-          </a:p>
-        </p:txBody>
-      </p:sp>
-      <p:pic>
-        <p:nvPicPr>
-          <p:cNvPr id="7" name="Graphic 6" descr="Appel">
-            <a:extLst>
-              <a:ext uri="{FF2B5EF4-FFF2-40B4-BE49-F238E27FC236}">
-                <a16:creationId xmlns:a16="http://schemas.microsoft.com/office/drawing/2014/main" id="{FECE7ACC-09EE-8246-9A30-4AEECC97970F}"/>
-              </a:ext>
-            </a:extLst>
-          </p:cNvPr>
-          <p:cNvPicPr>
-            <a:picLocks noChangeAspect="1"/>
-          </p:cNvPicPr>
-          <p:nvPr/>
-        </p:nvPicPr>
-        <p:blipFill>
-          <a:blip r:embed="rId4">
-            <a:extLst>
-              <a:ext uri="{96DAC541-7B7A-43D3-8B79-37D633B846F1}">
-                <asvg:svgBlip xmlns:asvg="http://schemas.microsoft.com/office/drawing/2016/SVG/main" r:embed="rId5"/>
-              </a:ext>
-            </a:extLst>
-          </a:blip>
-          <a:stretch>
-            <a:fillRect/>
-          </a:stretch>
-        </p:blipFill>
-        <p:spPr>
-          <a:xfrm>
-            <a:off x="7870411" y="2184604"/>
-            <a:ext cx="2155963" cy="2155963"/>
-          </a:xfrm>
-          <a:prstGeom prst="rect">
-            <a:avLst/>
-          </a:prstGeom>
-        </p:spPr>
-      </p:pic>
-    </p:spTree>
-    <p:extLst>
-      <p:ext uri="{BB962C8B-B14F-4D97-AF65-F5344CB8AC3E}">
-        <p14:creationId xmlns:p14="http://schemas.microsoft.com/office/powerpoint/2010/main" val="2071234218"/>
-      </p:ext>
-    </p:extLst>
-  </p:cSld>
-  <p:clrMapOvr>
-    <a:masterClrMapping/>
-  </p:clrMapOvr>
-</p:sld>
-</file>
-
-<file path=ppt/slides/slide4.xml><?xml version="1.0" encoding="utf-8"?>
-<p:sld xmlns:a="http://schemas.openxmlformats.org/drawingml/2006/main" xmlns:r="http://schemas.openxmlformats.org/officeDocument/2006/relationships" xmlns:p="http://schemas.openxmlformats.org/presentationml/2006/main">
-  <p:cSld>
-    <p:spTree>
-      <p:nvGrpSpPr>
-        <p:cNvPr id="1" name=""/>
-        <p:cNvGrpSpPr/>
-        <p:nvPr/>
-      </p:nvGrpSpPr>
-      <p:grpSpPr>
-        <a:xfrm>
-          <a:off x="0" y="0"/>
-          <a:ext cx="0" cy="0"/>
-          <a:chOff x="0" y="0"/>
-          <a:chExt cx="0" cy="0"/>
-        </a:xfrm>
-      </p:grpSpPr>
-      <p:pic>
-        <p:nvPicPr>
-          <p:cNvPr id="3" name="Graphic 2" descr="Appel">
-            <a:extLst>
-              <a:ext uri="{FF2B5EF4-FFF2-40B4-BE49-F238E27FC236}">
-                <a16:creationId xmlns:a16="http://schemas.microsoft.com/office/drawing/2014/main" id="{2427324D-01E2-EB4A-97F0-F6577F1A29B2}"/>
-              </a:ext>
-            </a:extLst>
-          </p:cNvPr>
-          <p:cNvPicPr>
-            <a:picLocks noChangeAspect="1"/>
-          </p:cNvPicPr>
-          <p:nvPr/>
-        </p:nvPicPr>
-        <p:blipFill>
-          <a:blip r:embed="rId2">
-            <a:extLst>
-              <a:ext uri="{96DAC541-7B7A-43D3-8B79-37D633B846F1}">
-                <asvg:svgBlip xmlns:asvg="http://schemas.microsoft.com/office/drawing/2016/SVG/main" r:embed="rId3"/>
-              </a:ext>
-            </a:extLst>
-          </a:blip>
-          <a:stretch>
-            <a:fillRect/>
-          </a:stretch>
-        </p:blipFill>
-        <p:spPr>
-          <a:xfrm>
-            <a:off x="2165626" y="2184604"/>
-            <a:ext cx="2155963" cy="2155963"/>
-          </a:xfrm>
-          <a:prstGeom prst="rect">
-            <a:avLst/>
-          </a:prstGeom>
-        </p:spPr>
-      </p:pic>
-      <p:sp>
-        <p:nvSpPr>
-          <p:cNvPr id="6" name="Tekstvak 5">
-            <a:extLst>
-              <a:ext uri="{FF2B5EF4-FFF2-40B4-BE49-F238E27FC236}">
-                <a16:creationId xmlns:a16="http://schemas.microsoft.com/office/drawing/2014/main" id="{EA4AC69E-9CD2-B146-8913-3D5BEA6B7FC9}"/>
-              </a:ext>
-            </a:extLst>
-          </p:cNvPr>
-          <p:cNvSpPr txBox="1"/>
-          <p:nvPr/>
-        </p:nvSpPr>
-        <p:spPr>
-          <a:xfrm>
-            <a:off x="4565774" y="2171311"/>
-            <a:ext cx="3060454" cy="2400657"/>
-          </a:xfrm>
-          <a:prstGeom prst="rect">
-            <a:avLst/>
-          </a:prstGeom>
-          <a:noFill/>
-        </p:spPr>
-        <p:txBody>
-          <a:bodyPr wrap="none" rtlCol="0">
-            <a:spAutoFit/>
-          </a:bodyPr>
-          <a:lstStyle/>
-          <a:p>
-            <a:pPr algn="ctr"/>
-            <a:r>
-              <a:rPr lang="nl-NL" sz="15000" b="1"/>
-              <a:t>===</a:t>
-            </a:r>
-          </a:p>
-        </p:txBody>
-      </p:sp>
-      <p:pic>
-        <p:nvPicPr>
-          <p:cNvPr id="7" name="Graphic 6" descr="Appel">
-            <a:extLst>
-              <a:ext uri="{FF2B5EF4-FFF2-40B4-BE49-F238E27FC236}">
-                <a16:creationId xmlns:a16="http://schemas.microsoft.com/office/drawing/2014/main" id="{FECE7ACC-09EE-8246-9A30-4AEECC97970F}"/>
-              </a:ext>
-            </a:extLst>
-          </p:cNvPr>
-          <p:cNvPicPr>
-            <a:picLocks noChangeAspect="1"/>
-          </p:cNvPicPr>
-          <p:nvPr/>
-        </p:nvPicPr>
-        <p:blipFill>
-          <a:blip r:embed="rId2">
-            <a:extLst>
-              <a:ext uri="{96DAC541-7B7A-43D3-8B79-37D633B846F1}">
-                <asvg:svgBlip xmlns:asvg="http://schemas.microsoft.com/office/drawing/2016/SVG/main" r:embed="rId3"/>
-              </a:ext>
-            </a:extLst>
-          </a:blip>
-          <a:stretch>
-            <a:fillRect/>
-          </a:stretch>
-        </p:blipFill>
-        <p:spPr>
-          <a:xfrm>
-            <a:off x="7870411" y="2184604"/>
-            <a:ext cx="2155963" cy="2155963"/>
-          </a:xfrm>
-          <a:prstGeom prst="rect">
-            <a:avLst/>
-          </a:prstGeom>
-        </p:spPr>
-      </p:pic>
-    </p:spTree>
-    <p:extLst>
-      <p:ext uri="{BB962C8B-B14F-4D97-AF65-F5344CB8AC3E}">
-        <p14:creationId xmlns:p14="http://schemas.microsoft.com/office/powerpoint/2010/main" val="1210725008"/>
+        <p14:creationId xmlns:p14="http://schemas.microsoft.com/office/powerpoint/2010/main" val="770842866"/>
       </p:ext>
     </p:extLst>
   </p:cSld>

</xml_diff>